<commit_message>
generate overall wavefront error for 1.293 microns instead of 1.060
</commit_message>
<xml_diff>
--- a/paper/graphics/zernike_bkg.pptx
+++ b/paper/graphics/zernike_bkg.pptx
@@ -7,6 +7,7 @@
   <p:sldIdLst>
     <p:sldId id="256" r:id="rId2"/>
     <p:sldId id="257" r:id="rId3"/>
+    <p:sldId id="258" r:id="rId4"/>
   </p:sldIdLst>
   <p:sldSz cx="12192000" cy="6858000"/>
   <p:notesSz cx="6858000" cy="9144000"/>
@@ -105,6 +106,11 @@
       </a:defRPr>
     </a:lvl9pPr>
   </p:defaultTextStyle>
+  <p:extLst>
+    <p:ext uri="{EFAFB233-063F-42B5-8137-9DF3F51BA10A}">
+      <p15:sldGuideLst xmlns:p15="http://schemas.microsoft.com/office/powerpoint/2012/main"/>
+    </p:ext>
+  </p:extLst>
 </p:presentation>
 </file>
 
@@ -239,7 +245,7 @@
           <a:p>
             <a:fld id="{16BC5588-BE3E-4759-8E15-69136FA548D5}" type="datetimeFigureOut">
               <a:rPr lang="en-US" smtClean="0"/>
-              <a:t>5/6/2024</a:t>
+              <a:t>1/17/2025</a:t>
             </a:fld>
             <a:endParaRPr lang="en-US"/>
           </a:p>
@@ -409,7 +415,7 @@
           <a:p>
             <a:fld id="{16BC5588-BE3E-4759-8E15-69136FA548D5}" type="datetimeFigureOut">
               <a:rPr lang="en-US" smtClean="0"/>
-              <a:t>5/6/2024</a:t>
+              <a:t>1/17/2025</a:t>
             </a:fld>
             <a:endParaRPr lang="en-US"/>
           </a:p>
@@ -589,7 +595,7 @@
           <a:p>
             <a:fld id="{16BC5588-BE3E-4759-8E15-69136FA548D5}" type="datetimeFigureOut">
               <a:rPr lang="en-US" smtClean="0"/>
-              <a:t>5/6/2024</a:t>
+              <a:t>1/17/2025</a:t>
             </a:fld>
             <a:endParaRPr lang="en-US"/>
           </a:p>
@@ -759,7 +765,7 @@
           <a:p>
             <a:fld id="{16BC5588-BE3E-4759-8E15-69136FA548D5}" type="datetimeFigureOut">
               <a:rPr lang="en-US" smtClean="0"/>
-              <a:t>5/6/2024</a:t>
+              <a:t>1/17/2025</a:t>
             </a:fld>
             <a:endParaRPr lang="en-US"/>
           </a:p>
@@ -1005,7 +1011,7 @@
           <a:p>
             <a:fld id="{16BC5588-BE3E-4759-8E15-69136FA548D5}" type="datetimeFigureOut">
               <a:rPr lang="en-US" smtClean="0"/>
-              <a:t>5/6/2024</a:t>
+              <a:t>1/17/2025</a:t>
             </a:fld>
             <a:endParaRPr lang="en-US"/>
           </a:p>
@@ -1237,7 +1243,7 @@
           <a:p>
             <a:fld id="{16BC5588-BE3E-4759-8E15-69136FA548D5}" type="datetimeFigureOut">
               <a:rPr lang="en-US" smtClean="0"/>
-              <a:t>5/6/2024</a:t>
+              <a:t>1/17/2025</a:t>
             </a:fld>
             <a:endParaRPr lang="en-US"/>
           </a:p>
@@ -1604,7 +1610,7 @@
           <a:p>
             <a:fld id="{16BC5588-BE3E-4759-8E15-69136FA548D5}" type="datetimeFigureOut">
               <a:rPr lang="en-US" smtClean="0"/>
-              <a:t>5/6/2024</a:t>
+              <a:t>1/17/2025</a:t>
             </a:fld>
             <a:endParaRPr lang="en-US"/>
           </a:p>
@@ -1722,7 +1728,7 @@
           <a:p>
             <a:fld id="{16BC5588-BE3E-4759-8E15-69136FA548D5}" type="datetimeFigureOut">
               <a:rPr lang="en-US" smtClean="0"/>
-              <a:t>5/6/2024</a:t>
+              <a:t>1/17/2025</a:t>
             </a:fld>
             <a:endParaRPr lang="en-US"/>
           </a:p>
@@ -1817,7 +1823,7 @@
           <a:p>
             <a:fld id="{16BC5588-BE3E-4759-8E15-69136FA548D5}" type="datetimeFigureOut">
               <a:rPr lang="en-US" smtClean="0"/>
-              <a:t>5/6/2024</a:t>
+              <a:t>1/17/2025</a:t>
             </a:fld>
             <a:endParaRPr lang="en-US"/>
           </a:p>
@@ -2094,7 +2100,7 @@
           <a:p>
             <a:fld id="{16BC5588-BE3E-4759-8E15-69136FA548D5}" type="datetimeFigureOut">
               <a:rPr lang="en-US" smtClean="0"/>
-              <a:t>5/6/2024</a:t>
+              <a:t>1/17/2025</a:t>
             </a:fld>
             <a:endParaRPr lang="en-US"/>
           </a:p>
@@ -2347,7 +2353,7 @@
           <a:p>
             <a:fld id="{16BC5588-BE3E-4759-8E15-69136FA548D5}" type="datetimeFigureOut">
               <a:rPr lang="en-US" smtClean="0"/>
-              <a:t>5/6/2024</a:t>
+              <a:t>1/17/2025</a:t>
             </a:fld>
             <a:endParaRPr lang="en-US"/>
           </a:p>
@@ -2560,7 +2566,7 @@
           <a:p>
             <a:fld id="{16BC5588-BE3E-4759-8E15-69136FA548D5}" type="datetimeFigureOut">
               <a:rPr lang="en-US" smtClean="0"/>
-              <a:t>5/6/2024</a:t>
+              <a:t>1/17/2025</a:t>
             </a:fld>
             <a:endParaRPr lang="en-US"/>
           </a:p>
@@ -4195,10 +4201,702 @@
           </a:fontRef>
         </p:style>
       </p:cxnSp>
+      <p:sp>
+        <p:nvSpPr>
+          <p:cNvPr id="26" name="TextBox 25"/>
+          <p:cNvSpPr txBox="1"/>
+          <p:nvPr/>
+        </p:nvSpPr>
+        <p:spPr>
+          <a:xfrm>
+            <a:off x="397225" y="387568"/>
+            <a:ext cx="2055043" cy="923330"/>
+          </a:xfrm>
+          <a:prstGeom prst="rect">
+            <a:avLst/>
+          </a:prstGeom>
+          <a:noFill/>
+        </p:spPr>
+        <p:txBody>
+          <a:bodyPr wrap="square" rtlCol="0">
+            <a:spAutoFit/>
+          </a:bodyPr>
+          <a:lstStyle/>
+          <a:p>
+            <a:r>
+              <a:rPr lang="en-US" dirty="0" smtClean="0"/>
+              <a:t>1.060 microns: central wavelength of F106 filter</a:t>
+            </a:r>
+          </a:p>
+        </p:txBody>
+      </p:sp>
     </p:spTree>
     <p:extLst>
       <p:ext uri="{BB962C8B-B14F-4D97-AF65-F5344CB8AC3E}">
         <p14:creationId xmlns:p14="http://schemas.microsoft.com/office/powerpoint/2010/main" val="2148238708"/>
+      </p:ext>
+    </p:extLst>
+  </p:cSld>
+  <p:clrMapOvr>
+    <a:masterClrMapping/>
+  </p:clrMapOvr>
+</p:sld>
+</file>
+
+<file path=ppt/slides/slide3.xml><?xml version="1.0" encoding="utf-8"?>
+<p:sld xmlns:a="http://schemas.openxmlformats.org/drawingml/2006/main" xmlns:r="http://schemas.openxmlformats.org/officeDocument/2006/relationships" xmlns:p="http://schemas.openxmlformats.org/presentationml/2006/main">
+  <p:cSld>
+    <p:spTree>
+      <p:nvGrpSpPr>
+        <p:cNvPr id="1" name=""/>
+        <p:cNvGrpSpPr/>
+        <p:nvPr/>
+      </p:nvGrpSpPr>
+      <p:grpSpPr>
+        <a:xfrm>
+          <a:off x="0" y="0"/>
+          <a:ext cx="0" cy="0"/>
+          <a:chOff x="0" y="0"/>
+          <a:chExt cx="0" cy="0"/>
+        </a:xfrm>
+      </p:grpSpPr>
+      <p:pic>
+        <p:nvPicPr>
+          <p:cNvPr id="5" name="Picture 4"/>
+          <p:cNvPicPr>
+            <a:picLocks noChangeAspect="1"/>
+          </p:cNvPicPr>
+          <p:nvPr/>
+        </p:nvPicPr>
+        <p:blipFill>
+          <a:blip r:embed="rId2">
+            <a:extLst>
+              <a:ext uri="{28A0092B-C50C-407E-A947-70E740481C1C}">
+                <a14:useLocalDpi xmlns:a14="http://schemas.microsoft.com/office/drawing/2010/main" val="0"/>
+              </a:ext>
+            </a:extLst>
+          </a:blip>
+          <a:stretch>
+            <a:fillRect/>
+          </a:stretch>
+        </p:blipFill>
+        <p:spPr>
+          <a:xfrm rot="14462037">
+            <a:off x="4245929" y="1374109"/>
+            <a:ext cx="777151" cy="777151"/>
+          </a:xfrm>
+          <a:prstGeom prst="rect">
+            <a:avLst/>
+          </a:prstGeom>
+        </p:spPr>
+      </p:pic>
+      <p:pic>
+        <p:nvPicPr>
+          <p:cNvPr id="6" name="Picture 5"/>
+          <p:cNvPicPr>
+            <a:picLocks noChangeAspect="1"/>
+          </p:cNvPicPr>
+          <p:nvPr/>
+        </p:nvPicPr>
+        <p:blipFill>
+          <a:blip r:embed="rId3">
+            <a:extLst>
+              <a:ext uri="{28A0092B-C50C-407E-A947-70E740481C1C}">
+                <a14:useLocalDpi xmlns:a14="http://schemas.microsoft.com/office/drawing/2010/main" val="0"/>
+              </a:ext>
+            </a:extLst>
+          </a:blip>
+          <a:stretch>
+            <a:fillRect/>
+          </a:stretch>
+        </p:blipFill>
+        <p:spPr>
+          <a:xfrm rot="14384785">
+            <a:off x="4963234" y="966900"/>
+            <a:ext cx="777240" cy="777240"/>
+          </a:xfrm>
+          <a:prstGeom prst="rect">
+            <a:avLst/>
+          </a:prstGeom>
+        </p:spPr>
+      </p:pic>
+      <p:pic>
+        <p:nvPicPr>
+          <p:cNvPr id="7" name="Picture 6"/>
+          <p:cNvPicPr>
+            <a:picLocks noChangeAspect="1"/>
+          </p:cNvPicPr>
+          <p:nvPr/>
+        </p:nvPicPr>
+        <p:blipFill>
+          <a:blip r:embed="rId4">
+            <a:extLst>
+              <a:ext uri="{28A0092B-C50C-407E-A947-70E740481C1C}">
+                <a14:useLocalDpi xmlns:a14="http://schemas.microsoft.com/office/drawing/2010/main" val="0"/>
+              </a:ext>
+            </a:extLst>
+          </a:blip>
+          <a:stretch>
+            <a:fillRect/>
+          </a:stretch>
+        </p:blipFill>
+        <p:spPr>
+          <a:xfrm rot="14383773">
+            <a:off x="5772662" y="498717"/>
+            <a:ext cx="777240" cy="777240"/>
+          </a:xfrm>
+          <a:prstGeom prst="rect">
+            <a:avLst/>
+          </a:prstGeom>
+        </p:spPr>
+      </p:pic>
+      <p:pic>
+        <p:nvPicPr>
+          <p:cNvPr id="10" name="Picture 9"/>
+          <p:cNvPicPr>
+            <a:picLocks noChangeAspect="1"/>
+          </p:cNvPicPr>
+          <p:nvPr/>
+        </p:nvPicPr>
+        <p:blipFill>
+          <a:blip r:embed="rId5">
+            <a:extLst>
+              <a:ext uri="{28A0092B-C50C-407E-A947-70E740481C1C}">
+                <a14:useLocalDpi xmlns:a14="http://schemas.microsoft.com/office/drawing/2010/main" val="0"/>
+              </a:ext>
+            </a:extLst>
+          </a:blip>
+          <a:stretch>
+            <a:fillRect/>
+          </a:stretch>
+        </p:blipFill>
+        <p:spPr>
+          <a:xfrm rot="14397064">
+            <a:off x="5842945" y="1453265"/>
+            <a:ext cx="777240" cy="777240"/>
+          </a:xfrm>
+          <a:prstGeom prst="rect">
+            <a:avLst/>
+          </a:prstGeom>
+        </p:spPr>
+      </p:pic>
+      <p:pic>
+        <p:nvPicPr>
+          <p:cNvPr id="11" name="Picture 10"/>
+          <p:cNvPicPr>
+            <a:picLocks noChangeAspect="1"/>
+          </p:cNvPicPr>
+          <p:nvPr/>
+        </p:nvPicPr>
+        <p:blipFill>
+          <a:blip r:embed="rId6">
+            <a:extLst>
+              <a:ext uri="{28A0092B-C50C-407E-A947-70E740481C1C}">
+                <a14:useLocalDpi xmlns:a14="http://schemas.microsoft.com/office/drawing/2010/main" val="0"/>
+              </a:ext>
+            </a:extLst>
+          </a:blip>
+          <a:stretch>
+            <a:fillRect/>
+          </a:stretch>
+        </p:blipFill>
+        <p:spPr>
+          <a:xfrm rot="14401374">
+            <a:off x="5031474" y="1914097"/>
+            <a:ext cx="777240" cy="777240"/>
+          </a:xfrm>
+          <a:prstGeom prst="rect">
+            <a:avLst/>
+          </a:prstGeom>
+        </p:spPr>
+      </p:pic>
+      <p:pic>
+        <p:nvPicPr>
+          <p:cNvPr id="12" name="Picture 11"/>
+          <p:cNvPicPr>
+            <a:picLocks noChangeAspect="1"/>
+          </p:cNvPicPr>
+          <p:nvPr/>
+        </p:nvPicPr>
+        <p:blipFill>
+          <a:blip r:embed="rId7">
+            <a:extLst>
+              <a:ext uri="{28A0092B-C50C-407E-A947-70E740481C1C}">
+                <a14:useLocalDpi xmlns:a14="http://schemas.microsoft.com/office/drawing/2010/main" val="0"/>
+              </a:ext>
+            </a:extLst>
+          </a:blip>
+          <a:stretch>
+            <a:fillRect/>
+          </a:stretch>
+        </p:blipFill>
+        <p:spPr>
+          <a:xfrm rot="14416106">
+            <a:off x="4314967" y="2337178"/>
+            <a:ext cx="777240" cy="777240"/>
+          </a:xfrm>
+          <a:prstGeom prst="rect">
+            <a:avLst/>
+          </a:prstGeom>
+        </p:spPr>
+      </p:pic>
+      <p:pic>
+        <p:nvPicPr>
+          <p:cNvPr id="13" name="Picture 12"/>
+          <p:cNvPicPr>
+            <a:picLocks noChangeAspect="1"/>
+          </p:cNvPicPr>
+          <p:nvPr/>
+        </p:nvPicPr>
+        <p:blipFill>
+          <a:blip r:embed="rId8">
+            <a:extLst>
+              <a:ext uri="{28A0092B-C50C-407E-A947-70E740481C1C}">
+                <a14:useLocalDpi xmlns:a14="http://schemas.microsoft.com/office/drawing/2010/main" val="0"/>
+              </a:ext>
+            </a:extLst>
+          </a:blip>
+          <a:stretch>
+            <a:fillRect/>
+          </a:stretch>
+        </p:blipFill>
+        <p:spPr>
+          <a:xfrm rot="14405683">
+            <a:off x="6127831" y="2290748"/>
+            <a:ext cx="777240" cy="777240"/>
+          </a:xfrm>
+          <a:prstGeom prst="rect">
+            <a:avLst/>
+          </a:prstGeom>
+        </p:spPr>
+      </p:pic>
+      <p:pic>
+        <p:nvPicPr>
+          <p:cNvPr id="14" name="Picture 13"/>
+          <p:cNvPicPr>
+            <a:picLocks noChangeAspect="1"/>
+          </p:cNvPicPr>
+          <p:nvPr/>
+        </p:nvPicPr>
+        <p:blipFill>
+          <a:blip r:embed="rId9">
+            <a:extLst>
+              <a:ext uri="{28A0092B-C50C-407E-A947-70E740481C1C}">
+                <a14:useLocalDpi xmlns:a14="http://schemas.microsoft.com/office/drawing/2010/main" val="0"/>
+              </a:ext>
+            </a:extLst>
+          </a:blip>
+          <a:stretch>
+            <a:fillRect/>
+          </a:stretch>
+        </p:blipFill>
+        <p:spPr>
+          <a:xfrm rot="14397624">
+            <a:off x="5320676" y="2751944"/>
+            <a:ext cx="777240" cy="777240"/>
+          </a:xfrm>
+          <a:prstGeom prst="rect">
+            <a:avLst/>
+          </a:prstGeom>
+        </p:spPr>
+      </p:pic>
+      <p:pic>
+        <p:nvPicPr>
+          <p:cNvPr id="16" name="Picture 15"/>
+          <p:cNvPicPr>
+            <a:picLocks noChangeAspect="1"/>
+          </p:cNvPicPr>
+          <p:nvPr/>
+        </p:nvPicPr>
+        <p:blipFill>
+          <a:blip r:embed="rId10">
+            <a:extLst>
+              <a:ext uri="{28A0092B-C50C-407E-A947-70E740481C1C}">
+                <a14:useLocalDpi xmlns:a14="http://schemas.microsoft.com/office/drawing/2010/main" val="0"/>
+              </a:ext>
+            </a:extLst>
+          </a:blip>
+          <a:stretch>
+            <a:fillRect/>
+          </a:stretch>
+        </p:blipFill>
+        <p:spPr>
+          <a:xfrm rot="14414715">
+            <a:off x="4596880" y="3174900"/>
+            <a:ext cx="777240" cy="777240"/>
+          </a:xfrm>
+          <a:prstGeom prst="rect">
+            <a:avLst/>
+          </a:prstGeom>
+        </p:spPr>
+      </p:pic>
+      <p:pic>
+        <p:nvPicPr>
+          <p:cNvPr id="17" name="Picture 16"/>
+          <p:cNvPicPr>
+            <a:picLocks noChangeAspect="1"/>
+          </p:cNvPicPr>
+          <p:nvPr/>
+        </p:nvPicPr>
+        <p:blipFill>
+          <a:blip r:embed="rId11">
+            <a:extLst>
+              <a:ext uri="{28A0092B-C50C-407E-A947-70E740481C1C}">
+                <a14:useLocalDpi xmlns:a14="http://schemas.microsoft.com/office/drawing/2010/main" val="0"/>
+              </a:ext>
+            </a:extLst>
+          </a:blip>
+          <a:stretch>
+            <a:fillRect/>
+          </a:stretch>
+        </p:blipFill>
+        <p:spPr>
+          <a:xfrm rot="14404387">
+            <a:off x="6560023" y="3033215"/>
+            <a:ext cx="777240" cy="777240"/>
+          </a:xfrm>
+          <a:prstGeom prst="rect">
+            <a:avLst/>
+          </a:prstGeom>
+        </p:spPr>
+      </p:pic>
+      <p:pic>
+        <p:nvPicPr>
+          <p:cNvPr id="18" name="Picture 17"/>
+          <p:cNvPicPr>
+            <a:picLocks noChangeAspect="1"/>
+          </p:cNvPicPr>
+          <p:nvPr/>
+        </p:nvPicPr>
+        <p:blipFill>
+          <a:blip r:embed="rId12">
+            <a:extLst>
+              <a:ext uri="{28A0092B-C50C-407E-A947-70E740481C1C}">
+                <a14:useLocalDpi xmlns:a14="http://schemas.microsoft.com/office/drawing/2010/main" val="0"/>
+              </a:ext>
+            </a:extLst>
+          </a:blip>
+          <a:stretch>
+            <a:fillRect/>
+          </a:stretch>
+        </p:blipFill>
+        <p:spPr>
+          <a:xfrm rot="14411252">
+            <a:off x="5754805" y="3497235"/>
+            <a:ext cx="777240" cy="777240"/>
+          </a:xfrm>
+          <a:prstGeom prst="rect">
+            <a:avLst/>
+          </a:prstGeom>
+        </p:spPr>
+      </p:pic>
+      <p:pic>
+        <p:nvPicPr>
+          <p:cNvPr id="19" name="Picture 18"/>
+          <p:cNvPicPr>
+            <a:picLocks noChangeAspect="1"/>
+          </p:cNvPicPr>
+          <p:nvPr/>
+        </p:nvPicPr>
+        <p:blipFill>
+          <a:blip r:embed="rId13">
+            <a:extLst>
+              <a:ext uri="{28A0092B-C50C-407E-A947-70E740481C1C}">
+                <a14:useLocalDpi xmlns:a14="http://schemas.microsoft.com/office/drawing/2010/main" val="0"/>
+              </a:ext>
+            </a:extLst>
+          </a:blip>
+          <a:stretch>
+            <a:fillRect/>
+          </a:stretch>
+        </p:blipFill>
+        <p:spPr>
+          <a:xfrm rot="14421716">
+            <a:off x="5031475" y="3913496"/>
+            <a:ext cx="777240" cy="777240"/>
+          </a:xfrm>
+          <a:prstGeom prst="rect">
+            <a:avLst/>
+          </a:prstGeom>
+        </p:spPr>
+      </p:pic>
+      <p:pic>
+        <p:nvPicPr>
+          <p:cNvPr id="20" name="Picture 19"/>
+          <p:cNvPicPr>
+            <a:picLocks noChangeAspect="1"/>
+          </p:cNvPicPr>
+          <p:nvPr/>
+        </p:nvPicPr>
+        <p:blipFill>
+          <a:blip r:embed="rId14">
+            <a:extLst>
+              <a:ext uri="{28A0092B-C50C-407E-A947-70E740481C1C}">
+                <a14:useLocalDpi xmlns:a14="http://schemas.microsoft.com/office/drawing/2010/main" val="0"/>
+              </a:ext>
+            </a:extLst>
+          </a:blip>
+          <a:stretch>
+            <a:fillRect/>
+          </a:stretch>
+        </p:blipFill>
+        <p:spPr>
+          <a:xfrm rot="14406419">
+            <a:off x="7140052" y="3695130"/>
+            <a:ext cx="777240" cy="777240"/>
+          </a:xfrm>
+          <a:prstGeom prst="rect">
+            <a:avLst/>
+          </a:prstGeom>
+        </p:spPr>
+      </p:pic>
+      <p:pic>
+        <p:nvPicPr>
+          <p:cNvPr id="21" name="Picture 20"/>
+          <p:cNvPicPr>
+            <a:picLocks noChangeAspect="1"/>
+          </p:cNvPicPr>
+          <p:nvPr/>
+        </p:nvPicPr>
+        <p:blipFill>
+          <a:blip r:embed="rId15">
+            <a:extLst>
+              <a:ext uri="{28A0092B-C50C-407E-A947-70E740481C1C}">
+                <a14:useLocalDpi xmlns:a14="http://schemas.microsoft.com/office/drawing/2010/main" val="0"/>
+              </a:ext>
+            </a:extLst>
+          </a:blip>
+          <a:stretch>
+            <a:fillRect/>
+          </a:stretch>
+        </p:blipFill>
+        <p:spPr>
+          <a:xfrm rot="14413477">
+            <a:off x="6328011" y="4159156"/>
+            <a:ext cx="777240" cy="777240"/>
+          </a:xfrm>
+          <a:prstGeom prst="rect">
+            <a:avLst/>
+          </a:prstGeom>
+        </p:spPr>
+      </p:pic>
+      <p:pic>
+        <p:nvPicPr>
+          <p:cNvPr id="22" name="Picture 21"/>
+          <p:cNvPicPr>
+            <a:picLocks noChangeAspect="1"/>
+          </p:cNvPicPr>
+          <p:nvPr/>
+        </p:nvPicPr>
+        <p:blipFill>
+          <a:blip r:embed="rId16">
+            <a:extLst>
+              <a:ext uri="{28A0092B-C50C-407E-A947-70E740481C1C}">
+                <a14:useLocalDpi xmlns:a14="http://schemas.microsoft.com/office/drawing/2010/main" val="0"/>
+              </a:ext>
+            </a:extLst>
+          </a:blip>
+          <a:stretch>
+            <a:fillRect/>
+          </a:stretch>
+        </p:blipFill>
+        <p:spPr>
+          <a:xfrm rot="14419001">
+            <a:off x="5611503" y="4575411"/>
+            <a:ext cx="777240" cy="777240"/>
+          </a:xfrm>
+          <a:prstGeom prst="rect">
+            <a:avLst/>
+          </a:prstGeom>
+        </p:spPr>
+      </p:pic>
+      <p:pic>
+        <p:nvPicPr>
+          <p:cNvPr id="23" name="Picture 22"/>
+          <p:cNvPicPr>
+            <a:picLocks noChangeAspect="1"/>
+          </p:cNvPicPr>
+          <p:nvPr/>
+        </p:nvPicPr>
+        <p:blipFill>
+          <a:blip r:embed="rId17">
+            <a:extLst>
+              <a:ext uri="{28A0092B-C50C-407E-A947-70E740481C1C}">
+                <a14:useLocalDpi xmlns:a14="http://schemas.microsoft.com/office/drawing/2010/main" val="0"/>
+              </a:ext>
+            </a:extLst>
+          </a:blip>
+          <a:stretch>
+            <a:fillRect/>
+          </a:stretch>
+        </p:blipFill>
+        <p:spPr>
+          <a:xfrm rot="14381926">
+            <a:off x="7936666" y="4236757"/>
+            <a:ext cx="777240" cy="777240"/>
+          </a:xfrm>
+          <a:prstGeom prst="rect">
+            <a:avLst/>
+          </a:prstGeom>
+        </p:spPr>
+      </p:pic>
+      <p:pic>
+        <p:nvPicPr>
+          <p:cNvPr id="24" name="Picture 23"/>
+          <p:cNvPicPr>
+            <a:picLocks noChangeAspect="1"/>
+          </p:cNvPicPr>
+          <p:nvPr/>
+        </p:nvPicPr>
+        <p:blipFill>
+          <a:blip r:embed="rId18">
+            <a:extLst>
+              <a:ext uri="{28A0092B-C50C-407E-A947-70E740481C1C}">
+                <a14:useLocalDpi xmlns:a14="http://schemas.microsoft.com/office/drawing/2010/main" val="0"/>
+              </a:ext>
+            </a:extLst>
+          </a:blip>
+          <a:stretch>
+            <a:fillRect/>
+          </a:stretch>
+        </p:blipFill>
+        <p:spPr>
+          <a:xfrm rot="14414074">
+            <a:off x="7119583" y="4698242"/>
+            <a:ext cx="777240" cy="777240"/>
+          </a:xfrm>
+          <a:prstGeom prst="rect">
+            <a:avLst/>
+          </a:prstGeom>
+        </p:spPr>
+      </p:pic>
+      <p:pic>
+        <p:nvPicPr>
+          <p:cNvPr id="25" name="Picture 24"/>
+          <p:cNvPicPr>
+            <a:picLocks noChangeAspect="1"/>
+          </p:cNvPicPr>
+          <p:nvPr/>
+        </p:nvPicPr>
+        <p:blipFill>
+          <a:blip r:embed="rId19">
+            <a:extLst>
+              <a:ext uri="{28A0092B-C50C-407E-A947-70E740481C1C}">
+                <a14:useLocalDpi xmlns:a14="http://schemas.microsoft.com/office/drawing/2010/main" val="0"/>
+              </a:ext>
+            </a:extLst>
+          </a:blip>
+          <a:stretch>
+            <a:fillRect/>
+          </a:stretch>
+        </p:blipFill>
+        <p:spPr>
+          <a:xfrm rot="14393995">
+            <a:off x="6409897" y="5121321"/>
+            <a:ext cx="777240" cy="777240"/>
+          </a:xfrm>
+          <a:prstGeom prst="rect">
+            <a:avLst/>
+          </a:prstGeom>
+        </p:spPr>
+      </p:pic>
+      <p:cxnSp>
+        <p:nvCxnSpPr>
+          <p:cNvPr id="3" name="Straight Connector 2"/>
+          <p:cNvCxnSpPr/>
+          <p:nvPr/>
+        </p:nvCxnSpPr>
+        <p:spPr>
+          <a:xfrm>
+            <a:off x="3032369" y="0"/>
+            <a:ext cx="7816" cy="6858000"/>
+          </a:xfrm>
+          <a:prstGeom prst="line">
+            <a:avLst/>
+          </a:prstGeom>
+        </p:spPr>
+        <p:style>
+          <a:lnRef idx="1">
+            <a:schemeClr val="accent1"/>
+          </a:lnRef>
+          <a:fillRef idx="0">
+            <a:schemeClr val="accent1"/>
+          </a:fillRef>
+          <a:effectRef idx="0">
+            <a:schemeClr val="accent1"/>
+          </a:effectRef>
+          <a:fontRef idx="minor">
+            <a:schemeClr val="tx1"/>
+          </a:fontRef>
+        </p:style>
+      </p:cxnSp>
+      <p:cxnSp>
+        <p:nvCxnSpPr>
+          <p:cNvPr id="15" name="Straight Connector 14"/>
+          <p:cNvCxnSpPr/>
+          <p:nvPr/>
+        </p:nvCxnSpPr>
+        <p:spPr>
+          <a:xfrm>
+            <a:off x="9154557" y="0"/>
+            <a:ext cx="0" cy="6852499"/>
+          </a:xfrm>
+          <a:prstGeom prst="line">
+            <a:avLst/>
+          </a:prstGeom>
+        </p:spPr>
+        <p:style>
+          <a:lnRef idx="1">
+            <a:schemeClr val="accent1"/>
+          </a:lnRef>
+          <a:fillRef idx="0">
+            <a:schemeClr val="accent1"/>
+          </a:fillRef>
+          <a:effectRef idx="0">
+            <a:schemeClr val="accent1"/>
+          </a:effectRef>
+          <a:fontRef idx="minor">
+            <a:schemeClr val="tx1"/>
+          </a:fontRef>
+        </p:style>
+      </p:cxnSp>
+      <p:sp>
+        <p:nvSpPr>
+          <p:cNvPr id="4" name="TextBox 3"/>
+          <p:cNvSpPr txBox="1"/>
+          <p:nvPr/>
+        </p:nvSpPr>
+        <p:spPr>
+          <a:xfrm>
+            <a:off x="397225" y="387568"/>
+            <a:ext cx="2055043" cy="923330"/>
+          </a:xfrm>
+          <a:prstGeom prst="rect">
+            <a:avLst/>
+          </a:prstGeom>
+          <a:noFill/>
+        </p:spPr>
+        <p:txBody>
+          <a:bodyPr wrap="square" rtlCol="0">
+            <a:spAutoFit/>
+          </a:bodyPr>
+          <a:lstStyle/>
+          <a:p>
+            <a:r>
+              <a:rPr lang="en-US" dirty="0"/>
+              <a:t>1.293 </a:t>
+            </a:r>
+            <a:r>
+              <a:rPr lang="en-US" dirty="0" smtClean="0"/>
+              <a:t>microns: central wavelength of F129 filter</a:t>
+            </a:r>
+          </a:p>
+        </p:txBody>
+      </p:sp>
+    </p:spTree>
+    <p:extLst>
+      <p:ext uri="{BB962C8B-B14F-4D97-AF65-F5344CB8AC3E}">
+        <p14:creationId xmlns:p14="http://schemas.microsoft.com/office/powerpoint/2010/main" val="859545128"/>
       </p:ext>
     </p:extLst>
   </p:cSld>

</xml_diff>